<commit_message>
Fixed label size of circular figure
</commit_message>
<xml_diff>
--- a/results/figures/illustrator/circle_fig_3.pptx
+++ b/results/figures/illustrator/circle_fig_3.pptx
@@ -206,7 +206,7 @@
           <a:p>
             <a:fld id="{A2A0DDFA-BF0F-2040-A359-C711B3D11968}" type="datetimeFigureOut">
               <a:rPr lang="pt-BR" smtClean="0"/>
-              <a:t>12/11/2024</a:t>
+              <a:t>20/11/2024</a:t>
             </a:fld>
             <a:endParaRPr lang="pt-BR"/>
           </a:p>
@@ -791,7 +791,7 @@
           <a:p>
             <a:fld id="{3D209C7E-7654-CB4E-B98C-B1DF063B3F8E}" type="datetimeFigureOut">
               <a:rPr lang="pt-BR" smtClean="0"/>
-              <a:t>12/11/2024</a:t>
+              <a:t>20/11/2024</a:t>
             </a:fld>
             <a:endParaRPr lang="pt-BR"/>
           </a:p>
@@ -991,7 +991,7 @@
           <a:p>
             <a:fld id="{3D209C7E-7654-CB4E-B98C-B1DF063B3F8E}" type="datetimeFigureOut">
               <a:rPr lang="pt-BR" smtClean="0"/>
-              <a:t>12/11/2024</a:t>
+              <a:t>20/11/2024</a:t>
             </a:fld>
             <a:endParaRPr lang="pt-BR"/>
           </a:p>
@@ -1201,7 +1201,7 @@
           <a:p>
             <a:fld id="{3D209C7E-7654-CB4E-B98C-B1DF063B3F8E}" type="datetimeFigureOut">
               <a:rPr lang="pt-BR" smtClean="0"/>
-              <a:t>12/11/2024</a:t>
+              <a:t>20/11/2024</a:t>
             </a:fld>
             <a:endParaRPr lang="pt-BR"/>
           </a:p>
@@ -1401,7 +1401,7 @@
           <a:p>
             <a:fld id="{3D209C7E-7654-CB4E-B98C-B1DF063B3F8E}" type="datetimeFigureOut">
               <a:rPr lang="pt-BR" smtClean="0"/>
-              <a:t>12/11/2024</a:t>
+              <a:t>20/11/2024</a:t>
             </a:fld>
             <a:endParaRPr lang="pt-BR"/>
           </a:p>
@@ -1677,7 +1677,7 @@
           <a:p>
             <a:fld id="{3D209C7E-7654-CB4E-B98C-B1DF063B3F8E}" type="datetimeFigureOut">
               <a:rPr lang="pt-BR" smtClean="0"/>
-              <a:t>12/11/2024</a:t>
+              <a:t>20/11/2024</a:t>
             </a:fld>
             <a:endParaRPr lang="pt-BR"/>
           </a:p>
@@ -1945,7 +1945,7 @@
           <a:p>
             <a:fld id="{3D209C7E-7654-CB4E-B98C-B1DF063B3F8E}" type="datetimeFigureOut">
               <a:rPr lang="pt-BR" smtClean="0"/>
-              <a:t>12/11/2024</a:t>
+              <a:t>20/11/2024</a:t>
             </a:fld>
             <a:endParaRPr lang="pt-BR"/>
           </a:p>
@@ -2360,7 +2360,7 @@
           <a:p>
             <a:fld id="{3D209C7E-7654-CB4E-B98C-B1DF063B3F8E}" type="datetimeFigureOut">
               <a:rPr lang="pt-BR" smtClean="0"/>
-              <a:t>12/11/2024</a:t>
+              <a:t>20/11/2024</a:t>
             </a:fld>
             <a:endParaRPr lang="pt-BR"/>
           </a:p>
@@ -2502,7 +2502,7 @@
           <a:p>
             <a:fld id="{3D209C7E-7654-CB4E-B98C-B1DF063B3F8E}" type="datetimeFigureOut">
               <a:rPr lang="pt-BR" smtClean="0"/>
-              <a:t>12/11/2024</a:t>
+              <a:t>20/11/2024</a:t>
             </a:fld>
             <a:endParaRPr lang="pt-BR"/>
           </a:p>
@@ -2615,7 +2615,7 @@
           <a:p>
             <a:fld id="{3D209C7E-7654-CB4E-B98C-B1DF063B3F8E}" type="datetimeFigureOut">
               <a:rPr lang="pt-BR" smtClean="0"/>
-              <a:t>12/11/2024</a:t>
+              <a:t>20/11/2024</a:t>
             </a:fld>
             <a:endParaRPr lang="pt-BR"/>
           </a:p>
@@ -2928,7 +2928,7 @@
           <a:p>
             <a:fld id="{3D209C7E-7654-CB4E-B98C-B1DF063B3F8E}" type="datetimeFigureOut">
               <a:rPr lang="pt-BR" smtClean="0"/>
-              <a:t>12/11/2024</a:t>
+              <a:t>20/11/2024</a:t>
             </a:fld>
             <a:endParaRPr lang="pt-BR"/>
           </a:p>
@@ -3217,7 +3217,7 @@
           <a:p>
             <a:fld id="{3D209C7E-7654-CB4E-B98C-B1DF063B3F8E}" type="datetimeFigureOut">
               <a:rPr lang="pt-BR" smtClean="0"/>
-              <a:t>12/11/2024</a:t>
+              <a:t>20/11/2024</a:t>
             </a:fld>
             <a:endParaRPr lang="pt-BR"/>
           </a:p>
@@ -3460,7 +3460,7 @@
           <a:p>
             <a:fld id="{3D209C7E-7654-CB4E-B98C-B1DF063B3F8E}" type="datetimeFigureOut">
               <a:rPr lang="pt-BR" smtClean="0"/>
-              <a:t>12/11/2024</a:t>
+              <a:t>20/11/2024</a:t>
             </a:fld>
             <a:endParaRPr lang="pt-BR"/>
           </a:p>
@@ -3891,8 +3891,8 @@
         </p:nvSpPr>
         <p:spPr>
           <a:xfrm>
-            <a:off x="-1113342" y="6226689"/>
-            <a:ext cx="13624224" cy="1025396"/>
+            <a:off x="-1047141" y="-343367"/>
+            <a:ext cx="13624224" cy="7986533"/>
           </a:xfrm>
           <a:prstGeom prst="rect">
             <a:avLst/>
@@ -3924,113 +3924,6 @@
           </a:p>
         </p:txBody>
       </p:sp>
-      <p:pic>
-        <p:nvPicPr>
-          <p:cNvPr id="5" name="Picture 4">
-            <a:extLst>
-              <a:ext uri="{FF2B5EF4-FFF2-40B4-BE49-F238E27FC236}">
-                <a16:creationId xmlns:a16="http://schemas.microsoft.com/office/drawing/2014/main" id="{D9A8DE0C-2A90-FE2A-E7D0-1796BB9CCA0E}"/>
-              </a:ext>
-            </a:extLst>
-          </p:cNvPr>
-          <p:cNvPicPr>
-            <a:picLocks noChangeAspect="1"/>
-          </p:cNvPicPr>
-          <p:nvPr/>
-        </p:nvPicPr>
-        <p:blipFill>
-          <a:blip r:embed="rId3"/>
-          <a:stretch>
-            <a:fillRect/>
-          </a:stretch>
-        </p:blipFill>
-        <p:spPr>
-          <a:xfrm>
-            <a:off x="5652882" y="-185692"/>
-            <a:ext cx="6858000" cy="6858000"/>
-          </a:xfrm>
-          <a:prstGeom prst="rect">
-            <a:avLst/>
-          </a:prstGeom>
-        </p:spPr>
-      </p:pic>
-      <p:pic>
-        <p:nvPicPr>
-          <p:cNvPr id="3" name="Picture 2">
-            <a:extLst>
-              <a:ext uri="{FF2B5EF4-FFF2-40B4-BE49-F238E27FC236}">
-                <a16:creationId xmlns:a16="http://schemas.microsoft.com/office/drawing/2014/main" id="{8BF9DA10-AECD-F924-8BE8-1DAEFDFEAA12}"/>
-              </a:ext>
-            </a:extLst>
-          </p:cNvPr>
-          <p:cNvPicPr>
-            <a:picLocks noChangeAspect="1"/>
-          </p:cNvPicPr>
-          <p:nvPr/>
-        </p:nvPicPr>
-        <p:blipFill>
-          <a:blip r:embed="rId4"/>
-          <a:stretch>
-            <a:fillRect/>
-          </a:stretch>
-        </p:blipFill>
-        <p:spPr>
-          <a:xfrm>
-            <a:off x="-1100112" y="-185692"/>
-            <a:ext cx="6858000" cy="6858000"/>
-          </a:xfrm>
-          <a:prstGeom prst="rect">
-            <a:avLst/>
-          </a:prstGeom>
-        </p:spPr>
-      </p:pic>
-      <p:sp>
-        <p:nvSpPr>
-          <p:cNvPr id="76" name="Rectangle 75">
-            <a:extLst>
-              <a:ext uri="{FF2B5EF4-FFF2-40B4-BE49-F238E27FC236}">
-                <a16:creationId xmlns:a16="http://schemas.microsoft.com/office/drawing/2014/main" id="{86733A6A-1B3F-E9E9-264E-BDB71F9D2B89}"/>
-              </a:ext>
-            </a:extLst>
-          </p:cNvPr>
-          <p:cNvSpPr/>
-          <p:nvPr/>
-        </p:nvSpPr>
-        <p:spPr>
-          <a:xfrm rot="21116149">
-            <a:off x="5812799" y="3101084"/>
-            <a:ext cx="415996" cy="944528"/>
-          </a:xfrm>
-          <a:prstGeom prst="rect">
-            <a:avLst/>
-          </a:prstGeom>
-          <a:ln>
-            <a:noFill/>
-          </a:ln>
-        </p:spPr>
-        <p:style>
-          <a:lnRef idx="2">
-            <a:schemeClr val="accent6"/>
-          </a:lnRef>
-          <a:fillRef idx="1">
-            <a:schemeClr val="lt1"/>
-          </a:fillRef>
-          <a:effectRef idx="0">
-            <a:schemeClr val="accent6"/>
-          </a:effectRef>
-          <a:fontRef idx="minor">
-            <a:schemeClr val="dk1"/>
-          </a:fontRef>
-        </p:style>
-        <p:txBody>
-          <a:bodyPr rtlCol="0" anchor="ctr"/>
-          <a:lstStyle/>
-          <a:p>
-            <a:pPr algn="ctr"/>
-            <a:endParaRPr lang="pt-BR"/>
-          </a:p>
-        </p:txBody>
-      </p:sp>
       <p:sp>
         <p:nvSpPr>
           <p:cNvPr id="100" name="TextBox 99">
@@ -4125,7 +4018,7 @@
         </p:nvSpPr>
         <p:spPr>
           <a:xfrm>
-            <a:off x="10892096" y="-488655"/>
+            <a:off x="10892096" y="-659757"/>
             <a:ext cx="2303575" cy="400110"/>
           </a:xfrm>
           <a:prstGeom prst="rect">
@@ -4151,12 +4044,70 @@
           </a:p>
         </p:txBody>
       </p:sp>
+      <p:pic>
+        <p:nvPicPr>
+          <p:cNvPr id="15" name="Picture 14">
+            <a:extLst>
+              <a:ext uri="{FF2B5EF4-FFF2-40B4-BE49-F238E27FC236}">
+                <a16:creationId xmlns:a16="http://schemas.microsoft.com/office/drawing/2014/main" id="{CC7FF458-365F-F91C-173D-7AD52A4C28E9}"/>
+              </a:ext>
+            </a:extLst>
+          </p:cNvPr>
+          <p:cNvPicPr>
+            <a:picLocks noChangeAspect="1"/>
+          </p:cNvPicPr>
+          <p:nvPr/>
+        </p:nvPicPr>
+        <p:blipFill>
+          <a:blip r:embed="rId3"/>
+          <a:srcRect l="10970" t="8809" r="11181" b="11102"/>
+          <a:stretch/>
+        </p:blipFill>
+        <p:spPr>
+          <a:xfrm>
+            <a:off x="-751523" y="-170838"/>
+            <a:ext cx="6344407" cy="6527071"/>
+          </a:xfrm>
+          <a:prstGeom prst="ellipse">
+            <a:avLst/>
+          </a:prstGeom>
+        </p:spPr>
+      </p:pic>
+      <p:pic>
+        <p:nvPicPr>
+          <p:cNvPr id="17" name="Picture 16">
+            <a:extLst>
+              <a:ext uri="{FF2B5EF4-FFF2-40B4-BE49-F238E27FC236}">
+                <a16:creationId xmlns:a16="http://schemas.microsoft.com/office/drawing/2014/main" id="{BE1D96AA-5827-BF20-E9BE-B662EA6CC2AE}"/>
+              </a:ext>
+            </a:extLst>
+          </p:cNvPr>
+          <p:cNvPicPr>
+            <a:picLocks noChangeAspect="1"/>
+          </p:cNvPicPr>
+          <p:nvPr/>
+        </p:nvPicPr>
+        <p:blipFill rotWithShape="1">
+          <a:blip r:embed="rId4"/>
+          <a:srcRect l="10748" t="8251" r="11651" b="10699"/>
+          <a:stretch/>
+        </p:blipFill>
+        <p:spPr>
+          <a:xfrm>
+            <a:off x="6246441" y="-170838"/>
+            <a:ext cx="6193249" cy="6468523"/>
+          </a:xfrm>
+          <a:prstGeom prst="ellipse">
+            <a:avLst/>
+          </a:prstGeom>
+        </p:spPr>
+      </p:pic>
       <p:grpSp>
         <p:nvGrpSpPr>
-          <p:cNvPr id="103" name="Group 102">
-            <a:extLst>
-              <a:ext uri="{FF2B5EF4-FFF2-40B4-BE49-F238E27FC236}">
-                <a16:creationId xmlns:a16="http://schemas.microsoft.com/office/drawing/2014/main" id="{850BEEA5-ED56-6DCA-B13E-E964BC2B256B}"/>
+          <p:cNvPr id="34" name="Group 33">
+            <a:extLst>
+              <a:ext uri="{FF2B5EF4-FFF2-40B4-BE49-F238E27FC236}">
+                <a16:creationId xmlns:a16="http://schemas.microsoft.com/office/drawing/2014/main" id="{828C8766-F86E-32CD-5ECC-0386FA997A95}"/>
               </a:ext>
             </a:extLst>
           </p:cNvPr>
@@ -4165,18 +4116,18 @@
         </p:nvGrpSpPr>
         <p:grpSpPr>
           <a:xfrm>
-            <a:off x="4797427" y="4747487"/>
-            <a:ext cx="2291129" cy="2204884"/>
-            <a:chOff x="4971476" y="57750"/>
-            <a:chExt cx="2291129" cy="2204884"/>
+            <a:off x="4576813" y="4642166"/>
+            <a:ext cx="2772526" cy="2771012"/>
+            <a:chOff x="4274963" y="1824255"/>
+            <a:chExt cx="2772526" cy="2771012"/>
           </a:xfrm>
         </p:grpSpPr>
         <p:pic>
           <p:nvPicPr>
-            <p:cNvPr id="104" name="Picture 103">
+            <p:cNvPr id="35" name="Picture 34">
               <a:extLst>
                 <a:ext uri="{FF2B5EF4-FFF2-40B4-BE49-F238E27FC236}">
-                  <a16:creationId xmlns:a16="http://schemas.microsoft.com/office/drawing/2014/main" id="{19B81253-D307-5185-F5FC-29822FC263E6}"/>
+                  <a16:creationId xmlns:a16="http://schemas.microsoft.com/office/drawing/2014/main" id="{EBE2CC8E-87D7-BC5E-07AE-DC272E790401}"/>
                 </a:ext>
               </a:extLst>
             </p:cNvPr>
@@ -4187,13 +4138,13 @@
           </p:nvPicPr>
           <p:blipFill>
             <a:blip r:embed="rId5"/>
-            <a:srcRect l="6651" t="6300" r="5990" b="2909"/>
+            <a:srcRect l="20559" t="16762" r="19479" b="19960"/>
             <a:stretch/>
           </p:blipFill>
           <p:spPr>
             <a:xfrm>
-              <a:off x="5217234" y="509014"/>
-              <a:ext cx="1508762" cy="1568024"/>
+              <a:off x="4762061" y="2284645"/>
+              <a:ext cx="1782538" cy="1881188"/>
             </a:xfrm>
             <a:prstGeom prst="ellipse">
               <a:avLst/>
@@ -4202,10 +4153,10 @@
         </p:pic>
         <p:sp>
           <p:nvSpPr>
-            <p:cNvPr id="105" name="Left Brace 104">
+            <p:cNvPr id="36" name="Rectangle 35">
               <a:extLst>
                 <a:ext uri="{FF2B5EF4-FFF2-40B4-BE49-F238E27FC236}">
-                  <a16:creationId xmlns:a16="http://schemas.microsoft.com/office/drawing/2014/main" id="{D6C89865-9E3F-2BCA-8090-6EA5D1101D1A}"/>
+                  <a16:creationId xmlns:a16="http://schemas.microsoft.com/office/drawing/2014/main" id="{26A4C1D3-FA3B-1BC0-5857-80E954BA8FAF}"/>
                 </a:ext>
               </a:extLst>
             </p:cNvPr>
@@ -4213,26 +4164,29 @@
             <p:nvPr/>
           </p:nvSpPr>
           <p:spPr>
-            <a:xfrm rot="20241202">
-              <a:off x="5165420" y="1322823"/>
-              <a:ext cx="229998" cy="597133"/>
+            <a:xfrm>
+              <a:off x="6006646" y="4103730"/>
+              <a:ext cx="114300" cy="45719"/>
             </a:xfrm>
-            <a:prstGeom prst="leftBrace">
+            <a:prstGeom prst="rect">
               <a:avLst/>
             </a:prstGeom>
+            <a:ln>
+              <a:noFill/>
+            </a:ln>
           </p:spPr>
           <p:style>
-            <a:lnRef idx="1">
-              <a:schemeClr val="dk1"/>
+            <a:lnRef idx="2">
+              <a:schemeClr val="accent6"/>
             </a:lnRef>
-            <a:fillRef idx="0">
-              <a:schemeClr val="dk1"/>
+            <a:fillRef idx="1">
+              <a:schemeClr val="lt1"/>
             </a:fillRef>
             <a:effectRef idx="0">
-              <a:schemeClr val="dk1"/>
+              <a:schemeClr val="accent6"/>
             </a:effectRef>
             <a:fontRef idx="minor">
-              <a:schemeClr val="tx1"/>
+              <a:schemeClr val="dk1"/>
             </a:fontRef>
           </p:style>
           <p:txBody>
@@ -4246,10 +4200,10 @@
         </p:sp>
         <p:sp>
           <p:nvSpPr>
-            <p:cNvPr id="106" name="Rectangle 105">
+            <p:cNvPr id="37" name="Rectangle 36">
               <a:extLst>
                 <a:ext uri="{FF2B5EF4-FFF2-40B4-BE49-F238E27FC236}">
-                  <a16:creationId xmlns:a16="http://schemas.microsoft.com/office/drawing/2014/main" id="{B57C9656-0E55-7695-A27A-E6E836A87157}"/>
+                  <a16:creationId xmlns:a16="http://schemas.microsoft.com/office/drawing/2014/main" id="{7BFD3F4C-E3D7-3A35-83DB-467A2F25F63D}"/>
                 </a:ext>
               </a:extLst>
             </p:cNvPr>
@@ -4257,8 +4211,8 @@
             <p:nvPr/>
           </p:nvSpPr>
           <p:spPr>
-            <a:xfrm rot="20341863">
-              <a:off x="6070073" y="1896408"/>
+            <a:xfrm rot="17077430">
+              <a:off x="6257958" y="3293280"/>
               <a:ext cx="343816" cy="150675"/>
             </a:xfrm>
             <a:prstGeom prst="rect">
@@ -4293,10 +4247,10 @@
         </p:sp>
         <p:sp>
           <p:nvSpPr>
-            <p:cNvPr id="107" name="Rectangle 106">
+            <p:cNvPr id="38" name="Left Brace 37">
               <a:extLst>
                 <a:ext uri="{FF2B5EF4-FFF2-40B4-BE49-F238E27FC236}">
-                  <a16:creationId xmlns:a16="http://schemas.microsoft.com/office/drawing/2014/main" id="{3E4E235A-6DC4-83C3-7E04-61546ED7807C}"/>
+                  <a16:creationId xmlns:a16="http://schemas.microsoft.com/office/drawing/2014/main" id="{73715818-592E-3548-5BFB-A8E2C948253D}"/>
                 </a:ext>
               </a:extLst>
             </p:cNvPr>
@@ -4304,153 +4258,15 @@
             <p:nvPr/>
           </p:nvSpPr>
           <p:spPr>
-            <a:xfrm>
-              <a:off x="6271949" y="2216915"/>
-              <a:ext cx="114300" cy="45719"/>
-            </a:xfrm>
-            <a:prstGeom prst="rect">
-              <a:avLst/>
-            </a:prstGeom>
-            <a:ln>
-              <a:noFill/>
-            </a:ln>
-          </p:spPr>
-          <p:style>
-            <a:lnRef idx="2">
-              <a:schemeClr val="accent6"/>
-            </a:lnRef>
-            <a:fillRef idx="1">
-              <a:schemeClr val="lt1"/>
-            </a:fillRef>
-            <a:effectRef idx="0">
-              <a:schemeClr val="accent6"/>
-            </a:effectRef>
-            <a:fontRef idx="minor">
-              <a:schemeClr val="dk1"/>
-            </a:fontRef>
-          </p:style>
-          <p:txBody>
-            <a:bodyPr rtlCol="0" anchor="ctr"/>
-            <a:lstStyle/>
-            <a:p>
-              <a:pPr algn="ctr"/>
-              <a:endParaRPr lang="en-US" noProof="0" dirty="0"/>
-            </a:p>
-          </p:txBody>
-        </p:sp>
-        <p:sp>
-          <p:nvSpPr>
-            <p:cNvPr id="108" name="Rectangle 107">
-              <a:extLst>
-                <a:ext uri="{FF2B5EF4-FFF2-40B4-BE49-F238E27FC236}">
-                  <a16:creationId xmlns:a16="http://schemas.microsoft.com/office/drawing/2014/main" id="{A015F31F-0256-B03C-6B01-BBE115833170}"/>
-                </a:ext>
-              </a:extLst>
-            </p:cNvPr>
-            <p:cNvSpPr/>
-            <p:nvPr/>
-          </p:nvSpPr>
-          <p:spPr>
-            <a:xfrm rot="18590773">
-              <a:off x="6362577" y="1693160"/>
-              <a:ext cx="343816" cy="150675"/>
-            </a:xfrm>
-            <a:prstGeom prst="rect">
-              <a:avLst/>
-            </a:prstGeom>
-            <a:ln>
-              <a:noFill/>
-            </a:ln>
-          </p:spPr>
-          <p:style>
-            <a:lnRef idx="2">
-              <a:schemeClr val="accent6"/>
-            </a:lnRef>
-            <a:fillRef idx="1">
-              <a:schemeClr val="lt1"/>
-            </a:fillRef>
-            <a:effectRef idx="0">
-              <a:schemeClr val="accent6"/>
-            </a:effectRef>
-            <a:fontRef idx="minor">
-              <a:schemeClr val="dk1"/>
-            </a:fontRef>
-          </p:style>
-          <p:txBody>
-            <a:bodyPr rtlCol="0" anchor="ctr"/>
-            <a:lstStyle/>
-            <a:p>
-              <a:pPr algn="ctr"/>
-              <a:endParaRPr lang="en-US" noProof="0" dirty="0"/>
-            </a:p>
-          </p:txBody>
-        </p:sp>
-        <p:sp>
-          <p:nvSpPr>
-            <p:cNvPr id="109" name="Rectangle 108">
-              <a:extLst>
-                <a:ext uri="{FF2B5EF4-FFF2-40B4-BE49-F238E27FC236}">
-                  <a16:creationId xmlns:a16="http://schemas.microsoft.com/office/drawing/2014/main" id="{8AB370A8-19F5-4E98-8A47-52D91DDA9207}"/>
-                </a:ext>
-              </a:extLst>
-            </p:cNvPr>
-            <p:cNvSpPr/>
-            <p:nvPr/>
-          </p:nvSpPr>
-          <p:spPr>
-            <a:xfrm rot="17077430">
-              <a:off x="6523261" y="1406465"/>
-              <a:ext cx="343816" cy="150675"/>
-            </a:xfrm>
-            <a:prstGeom prst="rect">
-              <a:avLst/>
-            </a:prstGeom>
-            <a:ln>
-              <a:noFill/>
-            </a:ln>
-          </p:spPr>
-          <p:style>
-            <a:lnRef idx="2">
-              <a:schemeClr val="accent6"/>
-            </a:lnRef>
-            <a:fillRef idx="1">
-              <a:schemeClr val="lt1"/>
-            </a:fillRef>
-            <a:effectRef idx="0">
-              <a:schemeClr val="accent6"/>
-            </a:effectRef>
-            <a:fontRef idx="minor">
-              <a:schemeClr val="dk1"/>
-            </a:fontRef>
-          </p:style>
-          <p:txBody>
-            <a:bodyPr rtlCol="0" anchor="ctr"/>
-            <a:lstStyle/>
-            <a:p>
-              <a:pPr algn="ctr"/>
-              <a:endParaRPr lang="en-US" noProof="0" dirty="0"/>
-            </a:p>
-          </p:txBody>
-        </p:sp>
-        <p:sp>
-          <p:nvSpPr>
-            <p:cNvPr id="110" name="Left Brace 109">
-              <a:extLst>
-                <a:ext uri="{FF2B5EF4-FFF2-40B4-BE49-F238E27FC236}">
-                  <a16:creationId xmlns:a16="http://schemas.microsoft.com/office/drawing/2014/main" id="{B81A7BF3-DC20-00D9-2D6A-26D1D1FE4FB6}"/>
-                </a:ext>
-              </a:extLst>
-            </p:cNvPr>
-            <p:cNvSpPr/>
-            <p:nvPr/>
-          </p:nvSpPr>
-          <p:spPr>
-            <a:xfrm rot="13721844">
-              <a:off x="6296208" y="1310462"/>
-              <a:ext cx="324445" cy="881445"/>
+            <a:xfrm rot="14820896">
+              <a:off x="5825572" y="3878643"/>
+              <a:ext cx="243362" cy="375378"/>
             </a:xfrm>
             <a:prstGeom prst="leftBrace">
-              <a:avLst/>
+              <a:avLst>
+                <a:gd name="adj1" fmla="val 8333"/>
+                <a:gd name="adj2" fmla="val 48847"/>
+              </a:avLst>
             </a:prstGeom>
           </p:spPr>
           <p:style>
@@ -4478,10 +4294,10 @@
         </p:sp>
         <p:sp>
           <p:nvSpPr>
-            <p:cNvPr id="111" name="TextBox 110">
+            <p:cNvPr id="39" name="TextBox 38">
               <a:extLst>
                 <a:ext uri="{FF2B5EF4-FFF2-40B4-BE49-F238E27FC236}">
-                  <a16:creationId xmlns:a16="http://schemas.microsoft.com/office/drawing/2014/main" id="{FD426286-037B-D433-3145-36C8FE8DF22B}"/>
+                  <a16:creationId xmlns:a16="http://schemas.microsoft.com/office/drawing/2014/main" id="{65386A1C-0D17-FD9E-AA1D-16003BDFFEA9}"/>
                 </a:ext>
               </a:extLst>
             </p:cNvPr>
@@ -4489,9 +4305,9 @@
             <p:nvPr/>
           </p:nvSpPr>
           <p:spPr>
-            <a:xfrm rot="4110883">
-              <a:off x="4673133" y="1573439"/>
-              <a:ext cx="827518" cy="230832"/>
+            <a:xfrm rot="4785408">
+              <a:off x="4142705" y="3321121"/>
+              <a:ext cx="726181" cy="461665"/>
             </a:xfrm>
             <a:prstGeom prst="rect">
               <a:avLst/>
@@ -4504,8 +4320,9 @@
             </a:bodyPr>
             <a:lstStyle/>
             <a:p>
+              <a:pPr algn="ctr"/>
               <a:r>
-                <a:rPr lang="en-US" sz="900" noProof="0" dirty="0">
+                <a:rPr lang="en-US" sz="1200" noProof="0" dirty="0">
                   <a:latin typeface="+mj-lt"/>
                 </a:rPr>
                 <a:t>Name of LME</a:t>
@@ -4513,72 +4330,24 @@
             </a:p>
           </p:txBody>
         </p:sp>
-        <p:sp>
-          <p:nvSpPr>
-            <p:cNvPr id="112" name="Rectangle 111">
+        <p:cxnSp>
+          <p:nvCxnSpPr>
+            <p:cNvPr id="40" name="Straight Arrow Connector 39">
               <a:extLst>
                 <a:ext uri="{FF2B5EF4-FFF2-40B4-BE49-F238E27FC236}">
-                  <a16:creationId xmlns:a16="http://schemas.microsoft.com/office/drawing/2014/main" id="{D1216F92-19C1-7DC3-77B4-2F801B34ABF5}"/>
-                </a:ext>
-              </a:extLst>
-            </p:cNvPr>
-            <p:cNvSpPr/>
-            <p:nvPr/>
-          </p:nvSpPr>
-          <p:spPr>
-            <a:xfrm rot="913311">
-              <a:off x="5587208" y="1922967"/>
-              <a:ext cx="343816" cy="150675"/>
-            </a:xfrm>
-            <a:prstGeom prst="rect">
-              <a:avLst/>
-            </a:prstGeom>
-            <a:ln>
-              <a:noFill/>
-            </a:ln>
-          </p:spPr>
-          <p:style>
-            <a:lnRef idx="2">
-              <a:schemeClr val="accent6"/>
-            </a:lnRef>
-            <a:fillRef idx="1">
-              <a:schemeClr val="lt1"/>
-            </a:fillRef>
-            <a:effectRef idx="0">
-              <a:schemeClr val="accent6"/>
-            </a:effectRef>
-            <a:fontRef idx="minor">
-              <a:schemeClr val="dk1"/>
-            </a:fontRef>
-          </p:style>
-          <p:txBody>
-            <a:bodyPr rtlCol="0" anchor="ctr"/>
-            <a:lstStyle/>
-            <a:p>
-              <a:pPr algn="ctr"/>
-              <a:endParaRPr lang="en-US" noProof="0" dirty="0"/>
-            </a:p>
-          </p:txBody>
-        </p:sp>
-        <p:cxnSp>
-          <p:nvCxnSpPr>
-            <p:cNvPr id="113" name="Straight Arrow Connector 112">
-              <a:extLst>
-                <a:ext uri="{FF2B5EF4-FFF2-40B4-BE49-F238E27FC236}">
-                  <a16:creationId xmlns:a16="http://schemas.microsoft.com/office/drawing/2014/main" id="{56AF694B-739E-B8ED-4413-4BD444C079B2}"/>
+                  <a16:creationId xmlns:a16="http://schemas.microsoft.com/office/drawing/2014/main" id="{49F8E8E8-F03E-353D-19B4-2820D2DEEEAD}"/>
                 </a:ext>
               </a:extLst>
             </p:cNvPr>
             <p:cNvCxnSpPr>
               <a:cxnSpLocks/>
-              <a:endCxn id="104" idx="1"/>
             </p:cNvCxnSpPr>
             <p:nvPr/>
           </p:nvCxnSpPr>
           <p:spPr>
             <a:xfrm flipH="1" flipV="1">
-              <a:off x="5438187" y="738646"/>
-              <a:ext cx="397129" cy="67410"/>
+              <a:off x="4994287" y="2528666"/>
+              <a:ext cx="543695" cy="321910"/>
             </a:xfrm>
             <a:prstGeom prst="straightConnector1">
               <a:avLst/>
@@ -4604,10 +4373,10 @@
         </p:cxnSp>
         <p:sp>
           <p:nvSpPr>
-            <p:cNvPr id="114" name="TextBox 113">
+            <p:cNvPr id="41" name="TextBox 40">
               <a:extLst>
                 <a:ext uri="{FF2B5EF4-FFF2-40B4-BE49-F238E27FC236}">
-                  <a16:creationId xmlns:a16="http://schemas.microsoft.com/office/drawing/2014/main" id="{79BC89AA-8BA1-5003-B209-98FA5B6B29DF}"/>
+                  <a16:creationId xmlns:a16="http://schemas.microsoft.com/office/drawing/2014/main" id="{6DA05FBF-3A9C-F5D3-7B36-41C832FE2C70}"/>
                 </a:ext>
               </a:extLst>
             </p:cNvPr>
@@ -4615,9 +4384,9 @@
             <p:nvPr/>
           </p:nvSpPr>
           <p:spPr>
-            <a:xfrm rot="18545946">
-              <a:off x="4474775" y="697040"/>
-              <a:ext cx="1509412" cy="230832"/>
+            <a:xfrm rot="18836050">
+              <a:off x="4045549" y="2440461"/>
+              <a:ext cx="1509412" cy="276999"/>
             </a:xfrm>
             <a:prstGeom prst="rect">
               <a:avLst/>
@@ -4632,7 +4401,7 @@
             <a:p>
               <a:pPr algn="ctr"/>
               <a:r>
-                <a:rPr lang="en-US" sz="900" noProof="0" dirty="0">
+                <a:rPr lang="en-US" sz="1200" noProof="0" dirty="0">
                   <a:latin typeface="+mj-lt"/>
                 </a:rPr>
                 <a:t>Direction of  shift</a:t>
@@ -4642,10 +4411,10 @@
         </p:sp>
         <p:sp>
           <p:nvSpPr>
-            <p:cNvPr id="115" name="TextBox 114">
+            <p:cNvPr id="42" name="TextBox 41">
               <a:extLst>
                 <a:ext uri="{FF2B5EF4-FFF2-40B4-BE49-F238E27FC236}">
-                  <a16:creationId xmlns:a16="http://schemas.microsoft.com/office/drawing/2014/main" id="{BE4BEC01-B157-F8D4-0922-79BDE4ECE1BC}"/>
+                  <a16:creationId xmlns:a16="http://schemas.microsoft.com/office/drawing/2014/main" id="{0B1B6910-C1B4-79F6-AEC7-7F1AA02B275E}"/>
                 </a:ext>
               </a:extLst>
             </p:cNvPr>
@@ -4653,9 +4422,9 @@
             <p:nvPr/>
           </p:nvSpPr>
           <p:spPr>
-            <a:xfrm rot="19279136">
-              <a:off x="5972172" y="1765720"/>
-              <a:ext cx="1290433" cy="369332"/>
+            <a:xfrm rot="20336778">
+              <a:off x="5429740" y="4133602"/>
+              <a:ext cx="1290433" cy="461665"/>
             </a:xfrm>
             <a:prstGeom prst="rect">
               <a:avLst/>
@@ -4670,7 +4439,7 @@
             <a:p>
               <a:pPr algn="ctr"/>
               <a:r>
-                <a:rPr lang="en-US" sz="900" noProof="0" dirty="0">
+                <a:rPr lang="en-US" sz="1200" noProof="0" dirty="0">
                   <a:latin typeface="+mj-lt"/>
                 </a:rPr>
                 <a:t>Proportion of all stocks shifting</a:t>
@@ -4680,10 +4449,10 @@
         </p:sp>
         <p:sp>
           <p:nvSpPr>
-            <p:cNvPr id="116" name="TextBox 115">
+            <p:cNvPr id="43" name="TextBox 42">
               <a:extLst>
                 <a:ext uri="{FF2B5EF4-FFF2-40B4-BE49-F238E27FC236}">
-                  <a16:creationId xmlns:a16="http://schemas.microsoft.com/office/drawing/2014/main" id="{A46D98EE-C676-7BC7-48EA-25A8BC4FBD86}"/>
+                  <a16:creationId xmlns:a16="http://schemas.microsoft.com/office/drawing/2014/main" id="{E2754226-1785-CE40-BD99-190911D4C5A5}"/>
                 </a:ext>
               </a:extLst>
             </p:cNvPr>
@@ -4692,8 +4461,8 @@
           </p:nvSpPr>
           <p:spPr>
             <a:xfrm>
-              <a:off x="5315832" y="311539"/>
-              <a:ext cx="1290433" cy="230832"/>
+              <a:off x="4960265" y="1902332"/>
+              <a:ext cx="1290433" cy="307777"/>
             </a:xfrm>
             <a:prstGeom prst="rect">
               <a:avLst/>
@@ -4708,7 +4477,7 @@
             <a:p>
               <a:pPr algn="ctr"/>
               <a:r>
-                <a:rPr lang="en-US" sz="900" b="1" noProof="0" dirty="0">
+                <a:rPr lang="en-US" sz="1400" b="1" noProof="0" dirty="0">
                   <a:latin typeface="+mj-lt"/>
                 </a:rPr>
                 <a:t>Legend key</a:t>
@@ -4716,150 +4485,215 @@
             </a:p>
           </p:txBody>
         </p:sp>
+        <p:cxnSp>
+          <p:nvCxnSpPr>
+            <p:cNvPr id="44" name="Straight Arrow Connector 43">
+              <a:extLst>
+                <a:ext uri="{FF2B5EF4-FFF2-40B4-BE49-F238E27FC236}">
+                  <a16:creationId xmlns:a16="http://schemas.microsoft.com/office/drawing/2014/main" id="{4AFCA418-CEFE-13AB-FD8E-70DCF9F2E5E5}"/>
+                </a:ext>
+              </a:extLst>
+            </p:cNvPr>
+            <p:cNvCxnSpPr>
+              <a:cxnSpLocks/>
+            </p:cNvCxnSpPr>
+            <p:nvPr/>
+          </p:nvCxnSpPr>
+          <p:spPr>
+            <a:xfrm flipH="1">
+              <a:off x="4695391" y="3462436"/>
+              <a:ext cx="232598" cy="35511"/>
+            </a:xfrm>
+            <a:prstGeom prst="straightConnector1">
+              <a:avLst/>
+            </a:prstGeom>
+            <a:ln>
+              <a:tailEnd type="triangle"/>
+            </a:ln>
+          </p:spPr>
+          <p:style>
+            <a:lnRef idx="1">
+              <a:schemeClr val="dk1"/>
+            </a:lnRef>
+            <a:fillRef idx="0">
+              <a:schemeClr val="dk1"/>
+            </a:fillRef>
+            <a:effectRef idx="0">
+              <a:schemeClr val="dk1"/>
+            </a:effectRef>
+            <a:fontRef idx="minor">
+              <a:schemeClr val="tx1"/>
+            </a:fontRef>
+          </p:style>
+        </p:cxnSp>
+        <p:sp>
+          <p:nvSpPr>
+            <p:cNvPr id="45" name="TextBox 44">
+              <a:extLst>
+                <a:ext uri="{FF2B5EF4-FFF2-40B4-BE49-F238E27FC236}">
+                  <a16:creationId xmlns:a16="http://schemas.microsoft.com/office/drawing/2014/main" id="{4257DDD8-6D1A-6E67-3ECE-5958404CC862}"/>
+                </a:ext>
+              </a:extLst>
+            </p:cNvPr>
+            <p:cNvSpPr txBox="1"/>
+            <p:nvPr/>
+          </p:nvSpPr>
+          <p:spPr>
+            <a:xfrm rot="17462461">
+              <a:off x="6302590" y="3399427"/>
+              <a:ext cx="1028134" cy="461665"/>
+            </a:xfrm>
+            <a:prstGeom prst="rect">
+              <a:avLst/>
+            </a:prstGeom>
+            <a:noFill/>
+          </p:spPr>
+          <p:txBody>
+            <a:bodyPr wrap="square" rtlCol="0">
+              <a:spAutoFit/>
+            </a:bodyPr>
+            <a:lstStyle/>
+            <a:p>
+              <a:pPr algn="ctr"/>
+              <a:r>
+                <a:rPr lang="en-US" sz="1200" noProof="0" dirty="0">
+                  <a:latin typeface="+mj-lt"/>
+                </a:rPr>
+                <a:t>Name of</a:t>
+              </a:r>
+            </a:p>
+            <a:p>
+              <a:pPr algn="ctr"/>
+              <a:r>
+                <a:rPr lang="en-US" sz="1200" noProof="0" dirty="0">
+                  <a:latin typeface="+mj-lt"/>
+                </a:rPr>
+                <a:t> LME</a:t>
+              </a:r>
+            </a:p>
+          </p:txBody>
+        </p:sp>
+        <p:cxnSp>
+          <p:nvCxnSpPr>
+            <p:cNvPr id="46" name="Straight Arrow Connector 45">
+              <a:extLst>
+                <a:ext uri="{FF2B5EF4-FFF2-40B4-BE49-F238E27FC236}">
+                  <a16:creationId xmlns:a16="http://schemas.microsoft.com/office/drawing/2014/main" id="{04BF5B64-EE1C-7CF2-C89A-4C6CC6635985}"/>
+                </a:ext>
+              </a:extLst>
+            </p:cNvPr>
+            <p:cNvCxnSpPr>
+              <a:cxnSpLocks/>
+            </p:cNvCxnSpPr>
+            <p:nvPr/>
+          </p:nvCxnSpPr>
+          <p:spPr>
+            <a:xfrm>
+              <a:off x="6313567" y="3446030"/>
+              <a:ext cx="297702" cy="89946"/>
+            </a:xfrm>
+            <a:prstGeom prst="straightConnector1">
+              <a:avLst/>
+            </a:prstGeom>
+            <a:ln>
+              <a:tailEnd type="triangle"/>
+            </a:ln>
+          </p:spPr>
+          <p:style>
+            <a:lnRef idx="1">
+              <a:schemeClr val="dk1"/>
+            </a:lnRef>
+            <a:fillRef idx="0">
+              <a:schemeClr val="dk1"/>
+            </a:fillRef>
+            <a:effectRef idx="0">
+              <a:schemeClr val="dk1"/>
+            </a:effectRef>
+            <a:fontRef idx="minor">
+              <a:schemeClr val="tx1"/>
+            </a:fontRef>
+          </p:style>
+        </p:cxnSp>
+        <p:sp>
+          <p:nvSpPr>
+            <p:cNvPr id="47" name="TextBox 46">
+              <a:extLst>
+                <a:ext uri="{FF2B5EF4-FFF2-40B4-BE49-F238E27FC236}">
+                  <a16:creationId xmlns:a16="http://schemas.microsoft.com/office/drawing/2014/main" id="{53AF91C6-A10D-670C-BFCA-255B6AA5339F}"/>
+                </a:ext>
+              </a:extLst>
+            </p:cNvPr>
+            <p:cNvSpPr txBox="1"/>
+            <p:nvPr/>
+          </p:nvSpPr>
+          <p:spPr>
+            <a:xfrm rot="1760234">
+              <a:off x="4406093" y="4130131"/>
+              <a:ext cx="1095501" cy="461665"/>
+            </a:xfrm>
+            <a:prstGeom prst="rect">
+              <a:avLst/>
+            </a:prstGeom>
+            <a:noFill/>
+          </p:spPr>
+          <p:txBody>
+            <a:bodyPr wrap="square" rtlCol="0">
+              <a:spAutoFit/>
+            </a:bodyPr>
+            <a:lstStyle/>
+            <a:p>
+              <a:pPr algn="ctr"/>
+              <a:r>
+                <a:rPr lang="en-US" sz="1200" noProof="0" dirty="0">
+                  <a:latin typeface="+mj-lt"/>
+                </a:rPr>
+                <a:t>Color of LME across figures</a:t>
+              </a:r>
+            </a:p>
+          </p:txBody>
+        </p:sp>
+        <p:cxnSp>
+          <p:nvCxnSpPr>
+            <p:cNvPr id="48" name="Straight Arrow Connector 47">
+              <a:extLst>
+                <a:ext uri="{FF2B5EF4-FFF2-40B4-BE49-F238E27FC236}">
+                  <a16:creationId xmlns:a16="http://schemas.microsoft.com/office/drawing/2014/main" id="{401C65E9-1E12-0B1B-631E-695BA8925940}"/>
+                </a:ext>
+              </a:extLst>
+            </p:cNvPr>
+            <p:cNvCxnSpPr>
+              <a:cxnSpLocks/>
+            </p:cNvCxnSpPr>
+            <p:nvPr/>
+          </p:nvCxnSpPr>
+          <p:spPr>
+            <a:xfrm flipH="1">
+              <a:off x="5121202" y="3859909"/>
+              <a:ext cx="191696" cy="296592"/>
+            </a:xfrm>
+            <a:prstGeom prst="straightConnector1">
+              <a:avLst/>
+            </a:prstGeom>
+            <a:ln>
+              <a:tailEnd type="triangle"/>
+            </a:ln>
+          </p:spPr>
+          <p:style>
+            <a:lnRef idx="1">
+              <a:schemeClr val="dk1"/>
+            </a:lnRef>
+            <a:fillRef idx="0">
+              <a:schemeClr val="dk1"/>
+            </a:fillRef>
+            <a:effectRef idx="0">
+              <a:schemeClr val="dk1"/>
+            </a:effectRef>
+            <a:fontRef idx="minor">
+              <a:schemeClr val="tx1"/>
+            </a:fontRef>
+          </p:style>
+        </p:cxnSp>
       </p:grpSp>
-      <p:pic>
-        <p:nvPicPr>
-          <p:cNvPr id="6" name="Picture 5">
-            <a:extLst>
-              <a:ext uri="{FF2B5EF4-FFF2-40B4-BE49-F238E27FC236}">
-                <a16:creationId xmlns:a16="http://schemas.microsoft.com/office/drawing/2014/main" id="{8CDAAE7F-F7A8-3BA1-7EBA-BAEB43E4458F}"/>
-              </a:ext>
-            </a:extLst>
-          </p:cNvPr>
-          <p:cNvPicPr>
-            <a:picLocks noChangeAspect="1"/>
-          </p:cNvPicPr>
-          <p:nvPr/>
-        </p:nvPicPr>
-        <p:blipFill>
-          <a:blip r:embed="rId4"/>
-          <a:srcRect l="3936" t="63910" r="85882" b="27325"/>
-          <a:stretch/>
-        </p:blipFill>
-        <p:spPr>
-          <a:xfrm rot="853986">
-            <a:off x="5641662" y="3369957"/>
-            <a:ext cx="698366" cy="601072"/>
-          </a:xfrm>
-          <a:prstGeom prst="triangle">
-            <a:avLst>
-              <a:gd name="adj" fmla="val 36031"/>
-            </a:avLst>
-          </a:prstGeom>
-        </p:spPr>
-      </p:pic>
-      <p:pic>
-        <p:nvPicPr>
-          <p:cNvPr id="78" name="Picture 77">
-            <a:extLst>
-              <a:ext uri="{FF2B5EF4-FFF2-40B4-BE49-F238E27FC236}">
-                <a16:creationId xmlns:a16="http://schemas.microsoft.com/office/drawing/2014/main" id="{8619D6EC-13AD-0F49-0C4F-4E0A2208DE56}"/>
-              </a:ext>
-            </a:extLst>
-          </p:cNvPr>
-          <p:cNvPicPr>
-            <a:picLocks noChangeAspect="1"/>
-          </p:cNvPicPr>
-          <p:nvPr/>
-        </p:nvPicPr>
-        <p:blipFill>
-          <a:blip r:embed="rId6"/>
-          <a:srcRect r="12021"/>
-          <a:stretch/>
-        </p:blipFill>
-        <p:spPr>
-          <a:xfrm>
-            <a:off x="5791732" y="2843502"/>
-            <a:ext cx="309845" cy="692223"/>
-          </a:xfrm>
-          <a:prstGeom prst="rect">
-            <a:avLst/>
-          </a:prstGeom>
-        </p:spPr>
-      </p:pic>
-      <p:cxnSp>
-        <p:nvCxnSpPr>
-          <p:cNvPr id="82" name="Straight Connector 81">
-            <a:extLst>
-              <a:ext uri="{FF2B5EF4-FFF2-40B4-BE49-F238E27FC236}">
-                <a16:creationId xmlns:a16="http://schemas.microsoft.com/office/drawing/2014/main" id="{B12F655C-563B-97AA-C6E8-3FEA3197BD98}"/>
-              </a:ext>
-            </a:extLst>
-          </p:cNvPr>
-          <p:cNvCxnSpPr>
-            <a:cxnSpLocks/>
-          </p:cNvCxnSpPr>
-          <p:nvPr/>
-        </p:nvCxnSpPr>
-        <p:spPr>
-          <a:xfrm flipH="1" flipV="1">
-            <a:off x="6081822" y="3287126"/>
-            <a:ext cx="200883" cy="101741"/>
-          </a:xfrm>
-          <a:prstGeom prst="line">
-            <a:avLst/>
-          </a:prstGeom>
-          <a:ln w="12700">
-            <a:headEnd type="none" w="med" len="med"/>
-            <a:tailEnd type="stealth" w="med" len="med"/>
-          </a:ln>
-        </p:spPr>
-        <p:style>
-          <a:lnRef idx="1">
-            <a:schemeClr val="dk1"/>
-          </a:lnRef>
-          <a:fillRef idx="0">
-            <a:schemeClr val="dk1"/>
-          </a:fillRef>
-          <a:effectRef idx="0">
-            <a:schemeClr val="dk1"/>
-          </a:effectRef>
-          <a:fontRef idx="minor">
-            <a:schemeClr val="tx1"/>
-          </a:fontRef>
-        </p:style>
-      </p:cxnSp>
-      <p:cxnSp>
-        <p:nvCxnSpPr>
-          <p:cNvPr id="83" name="Straight Connector 82">
-            <a:extLst>
-              <a:ext uri="{FF2B5EF4-FFF2-40B4-BE49-F238E27FC236}">
-                <a16:creationId xmlns:a16="http://schemas.microsoft.com/office/drawing/2014/main" id="{BB2BD591-83DE-0EB8-3F92-CB210F376287}"/>
-              </a:ext>
-            </a:extLst>
-          </p:cNvPr>
-          <p:cNvCxnSpPr>
-            <a:cxnSpLocks/>
-          </p:cNvCxnSpPr>
-          <p:nvPr/>
-        </p:nvCxnSpPr>
-        <p:spPr>
-          <a:xfrm flipV="1">
-            <a:off x="6088261" y="3685121"/>
-            <a:ext cx="252000" cy="36000"/>
-          </a:xfrm>
-          <a:prstGeom prst="line">
-            <a:avLst/>
-          </a:prstGeom>
-          <a:ln w="12700">
-            <a:headEnd type="stealth"/>
-          </a:ln>
-        </p:spPr>
-        <p:style>
-          <a:lnRef idx="1">
-            <a:schemeClr val="dk1"/>
-          </a:lnRef>
-          <a:fillRef idx="0">
-            <a:schemeClr val="dk1"/>
-          </a:fillRef>
-          <a:effectRef idx="0">
-            <a:schemeClr val="dk1"/>
-          </a:effectRef>
-          <a:fontRef idx="minor">
-            <a:schemeClr val="tx1"/>
-          </a:fontRef>
-        </p:style>
-      </p:cxnSp>
     </p:spTree>
     <p:extLst>
       <p:ext uri="{BB962C8B-B14F-4D97-AF65-F5344CB8AC3E}">
@@ -4972,10 +4806,10 @@
       </p:grpSpPr>
       <p:grpSp>
         <p:nvGrpSpPr>
-          <p:cNvPr id="27" name="Group 26">
-            <a:extLst>
-              <a:ext uri="{FF2B5EF4-FFF2-40B4-BE49-F238E27FC236}">
-                <a16:creationId xmlns:a16="http://schemas.microsoft.com/office/drawing/2014/main" id="{2D17C49D-0DE7-3BCB-EBDF-1071F6AE4E00}"/>
+          <p:cNvPr id="25" name="Group 24">
+            <a:extLst>
+              <a:ext uri="{FF2B5EF4-FFF2-40B4-BE49-F238E27FC236}">
+                <a16:creationId xmlns:a16="http://schemas.microsoft.com/office/drawing/2014/main" id="{0B5E7B9E-A02A-BA7A-9373-E6E887A60822}"/>
               </a:ext>
             </a:extLst>
           </p:cNvPr>
@@ -4984,18 +4818,18 @@
         </p:nvGrpSpPr>
         <p:grpSpPr>
           <a:xfrm>
-            <a:off x="4795626" y="478543"/>
-            <a:ext cx="2291129" cy="2204884"/>
-            <a:chOff x="4971476" y="57750"/>
-            <a:chExt cx="2291129" cy="2204884"/>
+            <a:off x="4472815" y="1755196"/>
+            <a:ext cx="2335126" cy="2763840"/>
+            <a:chOff x="4472815" y="1755196"/>
+            <a:chExt cx="2335126" cy="2763840"/>
           </a:xfrm>
         </p:grpSpPr>
         <p:pic>
           <p:nvPicPr>
-            <p:cNvPr id="28" name="Picture 27">
+            <p:cNvPr id="4" name="Picture 3">
               <a:extLst>
                 <a:ext uri="{FF2B5EF4-FFF2-40B4-BE49-F238E27FC236}">
-                  <a16:creationId xmlns:a16="http://schemas.microsoft.com/office/drawing/2014/main" id="{525D3AFD-B7BE-DB5A-47DB-2174751BD6C4}"/>
+                  <a16:creationId xmlns:a16="http://schemas.microsoft.com/office/drawing/2014/main" id="{DE670CAF-1718-2F60-3271-A45E312C8EFE}"/>
                 </a:ext>
               </a:extLst>
             </p:cNvPr>
@@ -5006,110 +4840,19 @@
           </p:nvPicPr>
           <p:blipFill>
             <a:blip r:embed="rId2"/>
-            <a:srcRect l="6651" t="6300" r="5990" b="2909"/>
+            <a:srcRect l="20559" t="16762" r="19479" b="19960"/>
             <a:stretch/>
           </p:blipFill>
           <p:spPr>
             <a:xfrm>
-              <a:off x="5217234" y="509014"/>
-              <a:ext cx="1508762" cy="1568024"/>
+              <a:off x="4762061" y="2284645"/>
+              <a:ext cx="1782538" cy="1881188"/>
             </a:xfrm>
             <a:prstGeom prst="ellipse">
               <a:avLst/>
             </a:prstGeom>
           </p:spPr>
         </p:pic>
-        <p:sp>
-          <p:nvSpPr>
-            <p:cNvPr id="29" name="Left Brace 28">
-              <a:extLst>
-                <a:ext uri="{FF2B5EF4-FFF2-40B4-BE49-F238E27FC236}">
-                  <a16:creationId xmlns:a16="http://schemas.microsoft.com/office/drawing/2014/main" id="{8BBB20E3-6428-F6B2-F710-3F1799F5A8BE}"/>
-                </a:ext>
-              </a:extLst>
-            </p:cNvPr>
-            <p:cNvSpPr/>
-            <p:nvPr/>
-          </p:nvSpPr>
-          <p:spPr>
-            <a:xfrm rot="20241202">
-              <a:off x="5165420" y="1322823"/>
-              <a:ext cx="229998" cy="597133"/>
-            </a:xfrm>
-            <a:prstGeom prst="leftBrace">
-              <a:avLst/>
-            </a:prstGeom>
-          </p:spPr>
-          <p:style>
-            <a:lnRef idx="1">
-              <a:schemeClr val="dk1"/>
-            </a:lnRef>
-            <a:fillRef idx="0">
-              <a:schemeClr val="dk1"/>
-            </a:fillRef>
-            <a:effectRef idx="0">
-              <a:schemeClr val="dk1"/>
-            </a:effectRef>
-            <a:fontRef idx="minor">
-              <a:schemeClr val="tx1"/>
-            </a:fontRef>
-          </p:style>
-          <p:txBody>
-            <a:bodyPr rtlCol="0" anchor="ctr"/>
-            <a:lstStyle/>
-            <a:p>
-              <a:pPr algn="ctr"/>
-              <a:endParaRPr lang="en-US" noProof="0" dirty="0"/>
-            </a:p>
-          </p:txBody>
-        </p:sp>
-        <p:sp>
-          <p:nvSpPr>
-            <p:cNvPr id="30" name="Rectangle 29">
-              <a:extLst>
-                <a:ext uri="{FF2B5EF4-FFF2-40B4-BE49-F238E27FC236}">
-                  <a16:creationId xmlns:a16="http://schemas.microsoft.com/office/drawing/2014/main" id="{46F73775-B5CB-20F8-2785-1F7F0C41C04C}"/>
-                </a:ext>
-              </a:extLst>
-            </p:cNvPr>
-            <p:cNvSpPr/>
-            <p:nvPr/>
-          </p:nvSpPr>
-          <p:spPr>
-            <a:xfrm rot="20341863">
-              <a:off x="6070073" y="1896408"/>
-              <a:ext cx="343816" cy="150675"/>
-            </a:xfrm>
-            <a:prstGeom prst="rect">
-              <a:avLst/>
-            </a:prstGeom>
-            <a:ln>
-              <a:noFill/>
-            </a:ln>
-          </p:spPr>
-          <p:style>
-            <a:lnRef idx="2">
-              <a:schemeClr val="accent6"/>
-            </a:lnRef>
-            <a:fillRef idx="1">
-              <a:schemeClr val="lt1"/>
-            </a:fillRef>
-            <a:effectRef idx="0">
-              <a:schemeClr val="accent6"/>
-            </a:effectRef>
-            <a:fontRef idx="minor">
-              <a:schemeClr val="dk1"/>
-            </a:fontRef>
-          </p:style>
-          <p:txBody>
-            <a:bodyPr rtlCol="0" anchor="ctr"/>
-            <a:lstStyle/>
-            <a:p>
-              <a:pPr algn="ctr"/>
-              <a:endParaRPr lang="en-US" noProof="0" dirty="0"/>
-            </a:p>
-          </p:txBody>
-        </p:sp>
         <p:sp>
           <p:nvSpPr>
             <p:cNvPr id="31" name="Rectangle 30">
@@ -5124,55 +4867,8 @@
           </p:nvSpPr>
           <p:spPr>
             <a:xfrm>
-              <a:off x="6271949" y="2216915"/>
+              <a:off x="6006646" y="4103730"/>
               <a:ext cx="114300" cy="45719"/>
-            </a:xfrm>
-            <a:prstGeom prst="rect">
-              <a:avLst/>
-            </a:prstGeom>
-            <a:ln>
-              <a:noFill/>
-            </a:ln>
-          </p:spPr>
-          <p:style>
-            <a:lnRef idx="2">
-              <a:schemeClr val="accent6"/>
-            </a:lnRef>
-            <a:fillRef idx="1">
-              <a:schemeClr val="lt1"/>
-            </a:fillRef>
-            <a:effectRef idx="0">
-              <a:schemeClr val="accent6"/>
-            </a:effectRef>
-            <a:fontRef idx="minor">
-              <a:schemeClr val="dk1"/>
-            </a:fontRef>
-          </p:style>
-          <p:txBody>
-            <a:bodyPr rtlCol="0" anchor="ctr"/>
-            <a:lstStyle/>
-            <a:p>
-              <a:pPr algn="ctr"/>
-              <a:endParaRPr lang="en-US" noProof="0" dirty="0"/>
-            </a:p>
-          </p:txBody>
-        </p:sp>
-        <p:sp>
-          <p:nvSpPr>
-            <p:cNvPr id="32" name="Rectangle 31">
-              <a:extLst>
-                <a:ext uri="{FF2B5EF4-FFF2-40B4-BE49-F238E27FC236}">
-                  <a16:creationId xmlns:a16="http://schemas.microsoft.com/office/drawing/2014/main" id="{ED7DAEE8-3A64-222B-6950-7C0662D344EE}"/>
-                </a:ext>
-              </a:extLst>
-            </p:cNvPr>
-            <p:cNvSpPr/>
-            <p:nvPr/>
-          </p:nvSpPr>
-          <p:spPr>
-            <a:xfrm rot="18590773">
-              <a:off x="6362577" y="1693160"/>
-              <a:ext cx="343816" cy="150675"/>
             </a:xfrm>
             <a:prstGeom prst="rect">
               <a:avLst/>
@@ -5218,7 +4914,7 @@
           </p:nvSpPr>
           <p:spPr>
             <a:xfrm rot="17077430">
-              <a:off x="6523261" y="1406465"/>
+              <a:off x="6257958" y="3293280"/>
               <a:ext cx="343816" cy="150675"/>
             </a:xfrm>
             <a:prstGeom prst="rect">
@@ -5264,12 +4960,15 @@
             <p:nvPr/>
           </p:nvSpPr>
           <p:spPr>
-            <a:xfrm rot="13721844">
-              <a:off x="6296208" y="1310462"/>
-              <a:ext cx="324445" cy="881445"/>
+            <a:xfrm rot="14820896">
+              <a:off x="5825572" y="3878643"/>
+              <a:ext cx="243362" cy="375378"/>
             </a:xfrm>
             <a:prstGeom prst="leftBrace">
-              <a:avLst/>
+              <a:avLst>
+                <a:gd name="adj1" fmla="val 8333"/>
+                <a:gd name="adj2" fmla="val 48847"/>
+              </a:avLst>
             </a:prstGeom>
           </p:spPr>
           <p:style>
@@ -5308,9 +5007,9 @@
             <p:nvPr/>
           </p:nvSpPr>
           <p:spPr>
-            <a:xfrm rot="4110883">
-              <a:off x="4673133" y="1573439"/>
-              <a:ext cx="827518" cy="230832"/>
+            <a:xfrm rot="4370127">
+              <a:off x="4103003" y="3408456"/>
+              <a:ext cx="993539" cy="253916"/>
             </a:xfrm>
             <a:prstGeom prst="rect">
               <a:avLst/>
@@ -5323,59 +5022,13 @@
             </a:bodyPr>
             <a:lstStyle/>
             <a:p>
+              <a:pPr algn="ctr"/>
               <a:r>
-                <a:rPr lang="en-US" sz="900" noProof="0" dirty="0">
+                <a:rPr lang="en-US" sz="1050" noProof="0" dirty="0">
                   <a:latin typeface="+mj-lt"/>
                 </a:rPr>
                 <a:t>Name of LME</a:t>
               </a:r>
-            </a:p>
-          </p:txBody>
-        </p:sp>
-        <p:sp>
-          <p:nvSpPr>
-            <p:cNvPr id="36" name="Rectangle 35">
-              <a:extLst>
-                <a:ext uri="{FF2B5EF4-FFF2-40B4-BE49-F238E27FC236}">
-                  <a16:creationId xmlns:a16="http://schemas.microsoft.com/office/drawing/2014/main" id="{A4C37E1A-3770-DF5F-E567-9D751783554D}"/>
-                </a:ext>
-              </a:extLst>
-            </p:cNvPr>
-            <p:cNvSpPr/>
-            <p:nvPr/>
-          </p:nvSpPr>
-          <p:spPr>
-            <a:xfrm rot="913311">
-              <a:off x="5587208" y="1922967"/>
-              <a:ext cx="343816" cy="150675"/>
-            </a:xfrm>
-            <a:prstGeom prst="rect">
-              <a:avLst/>
-            </a:prstGeom>
-            <a:ln>
-              <a:noFill/>
-            </a:ln>
-          </p:spPr>
-          <p:style>
-            <a:lnRef idx="2">
-              <a:schemeClr val="accent6"/>
-            </a:lnRef>
-            <a:fillRef idx="1">
-              <a:schemeClr val="lt1"/>
-            </a:fillRef>
-            <a:effectRef idx="0">
-              <a:schemeClr val="accent6"/>
-            </a:effectRef>
-            <a:fontRef idx="minor">
-              <a:schemeClr val="dk1"/>
-            </a:fontRef>
-          </p:style>
-          <p:txBody>
-            <a:bodyPr rtlCol="0" anchor="ctr"/>
-            <a:lstStyle/>
-            <a:p>
-              <a:pPr algn="ctr"/>
-              <a:endParaRPr lang="en-US" noProof="0" dirty="0"/>
             </a:p>
           </p:txBody>
         </p:sp>
@@ -5390,14 +5043,13 @@
             </p:cNvPr>
             <p:cNvCxnSpPr>
               <a:cxnSpLocks/>
-              <a:endCxn id="28" idx="1"/>
             </p:cNvCxnSpPr>
             <p:nvPr/>
           </p:nvCxnSpPr>
           <p:spPr>
             <a:xfrm flipH="1" flipV="1">
-              <a:off x="5438187" y="738646"/>
-              <a:ext cx="397129" cy="67410"/>
+              <a:off x="4994287" y="2528666"/>
+              <a:ext cx="543695" cy="321910"/>
             </a:xfrm>
             <a:prstGeom prst="straightConnector1">
               <a:avLst/>
@@ -5434,9 +5086,9 @@
             <p:nvPr/>
           </p:nvSpPr>
           <p:spPr>
-            <a:xfrm rot="18545946">
-              <a:off x="4474775" y="697040"/>
-              <a:ext cx="1509412" cy="230832"/>
+            <a:xfrm rot="18836050">
+              <a:off x="4146310" y="2382944"/>
+              <a:ext cx="1509412" cy="253916"/>
             </a:xfrm>
             <a:prstGeom prst="rect">
               <a:avLst/>
@@ -5451,7 +5103,7 @@
             <a:p>
               <a:pPr algn="ctr"/>
               <a:r>
-                <a:rPr lang="en-US" sz="900" noProof="0" dirty="0">
+                <a:rPr lang="en-US" sz="1050" noProof="0" dirty="0">
                   <a:latin typeface="+mj-lt"/>
                 </a:rPr>
                 <a:t>Direction of  shift</a:t>
@@ -5472,9 +5124,9 @@
             <p:nvPr/>
           </p:nvSpPr>
           <p:spPr>
-            <a:xfrm rot="19279136">
-              <a:off x="5972172" y="1765720"/>
-              <a:ext cx="1290433" cy="369332"/>
+            <a:xfrm rot="20089194">
+              <a:off x="5410354" y="4103538"/>
+              <a:ext cx="1290433" cy="415498"/>
             </a:xfrm>
             <a:prstGeom prst="rect">
               <a:avLst/>
@@ -5489,7 +5141,7 @@
             <a:p>
               <a:pPr algn="ctr"/>
               <a:r>
-                <a:rPr lang="en-US" sz="900" noProof="0" dirty="0">
+                <a:rPr lang="en-US" sz="1050" noProof="0" dirty="0">
                   <a:latin typeface="+mj-lt"/>
                 </a:rPr>
                 <a:t>Proportion of all stocks shifting</a:t>
@@ -5511,8 +5163,8 @@
           </p:nvSpPr>
           <p:spPr>
             <a:xfrm>
-              <a:off x="5315832" y="311539"/>
-              <a:ext cx="1290433" cy="230832"/>
+              <a:off x="4960265" y="1910608"/>
+              <a:ext cx="1290433" cy="246221"/>
             </a:xfrm>
             <a:prstGeom prst="rect">
               <a:avLst/>
@@ -5527,7 +5179,7 @@
             <a:p>
               <a:pPr algn="ctr"/>
               <a:r>
-                <a:rPr lang="en-US" sz="900" b="1" noProof="0" dirty="0">
+                <a:rPr lang="en-US" sz="1000" b="1" noProof="0" dirty="0">
                   <a:latin typeface="+mj-lt"/>
                 </a:rPr>
                 <a:t>Legend key</a:t>
@@ -5535,6 +5187,205 @@
             </a:p>
           </p:txBody>
         </p:sp>
+        <p:cxnSp>
+          <p:nvCxnSpPr>
+            <p:cNvPr id="11" name="Straight Arrow Connector 10">
+              <a:extLst>
+                <a:ext uri="{FF2B5EF4-FFF2-40B4-BE49-F238E27FC236}">
+                  <a16:creationId xmlns:a16="http://schemas.microsoft.com/office/drawing/2014/main" id="{6CBD9EFA-F113-6CA6-6BF3-0B1D0A2932DE}"/>
+                </a:ext>
+              </a:extLst>
+            </p:cNvPr>
+            <p:cNvCxnSpPr>
+              <a:cxnSpLocks/>
+            </p:cNvCxnSpPr>
+            <p:nvPr/>
+          </p:nvCxnSpPr>
+          <p:spPr>
+            <a:xfrm flipH="1">
+              <a:off x="4695391" y="3462436"/>
+              <a:ext cx="232598" cy="35511"/>
+            </a:xfrm>
+            <a:prstGeom prst="straightConnector1">
+              <a:avLst/>
+            </a:prstGeom>
+            <a:ln>
+              <a:tailEnd type="triangle"/>
+            </a:ln>
+          </p:spPr>
+          <p:style>
+            <a:lnRef idx="1">
+              <a:schemeClr val="dk1"/>
+            </a:lnRef>
+            <a:fillRef idx="0">
+              <a:schemeClr val="dk1"/>
+            </a:fillRef>
+            <a:effectRef idx="0">
+              <a:schemeClr val="dk1"/>
+            </a:effectRef>
+            <a:fontRef idx="minor">
+              <a:schemeClr val="tx1"/>
+            </a:fontRef>
+          </p:style>
+        </p:cxnSp>
+        <p:sp>
+          <p:nvSpPr>
+            <p:cNvPr id="13" name="TextBox 12">
+              <a:extLst>
+                <a:ext uri="{FF2B5EF4-FFF2-40B4-BE49-F238E27FC236}">
+                  <a16:creationId xmlns:a16="http://schemas.microsoft.com/office/drawing/2014/main" id="{99696FA6-D5A3-703E-A869-B413CFCAD6D8}"/>
+                </a:ext>
+              </a:extLst>
+            </p:cNvPr>
+            <p:cNvSpPr txBox="1"/>
+            <p:nvPr/>
+          </p:nvSpPr>
+          <p:spPr>
+            <a:xfrm rot="16997977">
+              <a:off x="6217620" y="3364684"/>
+              <a:ext cx="926726" cy="253916"/>
+            </a:xfrm>
+            <a:prstGeom prst="rect">
+              <a:avLst/>
+            </a:prstGeom>
+            <a:noFill/>
+          </p:spPr>
+          <p:txBody>
+            <a:bodyPr wrap="square" rtlCol="0">
+              <a:spAutoFit/>
+            </a:bodyPr>
+            <a:lstStyle/>
+            <a:p>
+              <a:r>
+                <a:rPr lang="en-US" sz="1050" noProof="0" dirty="0">
+                  <a:latin typeface="+mj-lt"/>
+                </a:rPr>
+                <a:t>Name of LME</a:t>
+              </a:r>
+            </a:p>
+          </p:txBody>
+        </p:sp>
+        <p:cxnSp>
+          <p:nvCxnSpPr>
+            <p:cNvPr id="17" name="Straight Arrow Connector 16">
+              <a:extLst>
+                <a:ext uri="{FF2B5EF4-FFF2-40B4-BE49-F238E27FC236}">
+                  <a16:creationId xmlns:a16="http://schemas.microsoft.com/office/drawing/2014/main" id="{27E44799-CE0C-9907-04F6-D03EA1F9A049}"/>
+                </a:ext>
+              </a:extLst>
+            </p:cNvPr>
+            <p:cNvCxnSpPr>
+              <a:cxnSpLocks/>
+              <a:endCxn id="13" idx="0"/>
+            </p:cNvCxnSpPr>
+            <p:nvPr/>
+          </p:nvCxnSpPr>
+          <p:spPr>
+            <a:xfrm>
+              <a:off x="6313567" y="3446030"/>
+              <a:ext cx="243863" cy="16406"/>
+            </a:xfrm>
+            <a:prstGeom prst="straightConnector1">
+              <a:avLst/>
+            </a:prstGeom>
+            <a:ln>
+              <a:tailEnd type="triangle"/>
+            </a:ln>
+          </p:spPr>
+          <p:style>
+            <a:lnRef idx="1">
+              <a:schemeClr val="dk1"/>
+            </a:lnRef>
+            <a:fillRef idx="0">
+              <a:schemeClr val="dk1"/>
+            </a:fillRef>
+            <a:effectRef idx="0">
+              <a:schemeClr val="dk1"/>
+            </a:effectRef>
+            <a:fontRef idx="minor">
+              <a:schemeClr val="tx1"/>
+            </a:fontRef>
+          </p:style>
+        </p:cxnSp>
+        <p:sp>
+          <p:nvSpPr>
+            <p:cNvPr id="22" name="TextBox 21">
+              <a:extLst>
+                <a:ext uri="{FF2B5EF4-FFF2-40B4-BE49-F238E27FC236}">
+                  <a16:creationId xmlns:a16="http://schemas.microsoft.com/office/drawing/2014/main" id="{2FCBFD1E-ACED-3CEF-B266-A1E9CD863512}"/>
+                </a:ext>
+              </a:extLst>
+            </p:cNvPr>
+            <p:cNvSpPr txBox="1"/>
+            <p:nvPr/>
+          </p:nvSpPr>
+          <p:spPr>
+            <a:xfrm rot="2016938">
+              <a:off x="4536512" y="4085900"/>
+              <a:ext cx="939766" cy="415498"/>
+            </a:xfrm>
+            <a:prstGeom prst="rect">
+              <a:avLst/>
+            </a:prstGeom>
+            <a:noFill/>
+          </p:spPr>
+          <p:txBody>
+            <a:bodyPr wrap="square" rtlCol="0">
+              <a:spAutoFit/>
+            </a:bodyPr>
+            <a:lstStyle/>
+            <a:p>
+              <a:pPr algn="ctr"/>
+              <a:r>
+                <a:rPr lang="en-US" sz="1050" noProof="0" dirty="0">
+                  <a:latin typeface="+mj-lt"/>
+                </a:rPr>
+                <a:t>Color of LME across figures</a:t>
+              </a:r>
+            </a:p>
+          </p:txBody>
+        </p:sp>
+        <p:cxnSp>
+          <p:nvCxnSpPr>
+            <p:cNvPr id="23" name="Straight Arrow Connector 22">
+              <a:extLst>
+                <a:ext uri="{FF2B5EF4-FFF2-40B4-BE49-F238E27FC236}">
+                  <a16:creationId xmlns:a16="http://schemas.microsoft.com/office/drawing/2014/main" id="{959B23B0-EB77-66D3-57A3-53172068E4CF}"/>
+                </a:ext>
+              </a:extLst>
+            </p:cNvPr>
+            <p:cNvCxnSpPr>
+              <a:cxnSpLocks/>
+            </p:cNvCxnSpPr>
+            <p:nvPr/>
+          </p:nvCxnSpPr>
+          <p:spPr>
+            <a:xfrm flipH="1">
+              <a:off x="5121202" y="3859909"/>
+              <a:ext cx="191696" cy="296592"/>
+            </a:xfrm>
+            <a:prstGeom prst="straightConnector1">
+              <a:avLst/>
+            </a:prstGeom>
+            <a:ln>
+              <a:tailEnd type="triangle"/>
+            </a:ln>
+          </p:spPr>
+          <p:style>
+            <a:lnRef idx="1">
+              <a:schemeClr val="dk1"/>
+            </a:lnRef>
+            <a:fillRef idx="0">
+              <a:schemeClr val="dk1"/>
+            </a:fillRef>
+            <a:effectRef idx="0">
+              <a:schemeClr val="dk1"/>
+            </a:effectRef>
+            <a:fontRef idx="minor">
+              <a:schemeClr val="tx1"/>
+            </a:fontRef>
+          </p:style>
+        </p:cxnSp>
       </p:grpSp>
     </p:spTree>
     <p:extLst>

</xml_diff>

<commit_message>
updated fig 1 and fig 3 for v2 submission
</commit_message>
<xml_diff>
--- a/results/figures/illustrator/circle_fig_3.pptx
+++ b/results/figures/illustrator/circle_fig_3.pptx
@@ -206,7 +206,7 @@
           <a:p>
             <a:fld id="{A2A0DDFA-BF0F-2040-A359-C711B3D11968}" type="datetimeFigureOut">
               <a:rPr lang="pt-BR" smtClean="0"/>
-              <a:t>20/11/2024</a:t>
+              <a:t>26/05/2025</a:t>
             </a:fld>
             <a:endParaRPr lang="pt-BR"/>
           </a:p>
@@ -791,7 +791,7 @@
           <a:p>
             <a:fld id="{3D209C7E-7654-CB4E-B98C-B1DF063B3F8E}" type="datetimeFigureOut">
               <a:rPr lang="pt-BR" smtClean="0"/>
-              <a:t>20/11/2024</a:t>
+              <a:t>26/05/2025</a:t>
             </a:fld>
             <a:endParaRPr lang="pt-BR"/>
           </a:p>
@@ -991,7 +991,7 @@
           <a:p>
             <a:fld id="{3D209C7E-7654-CB4E-B98C-B1DF063B3F8E}" type="datetimeFigureOut">
               <a:rPr lang="pt-BR" smtClean="0"/>
-              <a:t>20/11/2024</a:t>
+              <a:t>26/05/2025</a:t>
             </a:fld>
             <a:endParaRPr lang="pt-BR"/>
           </a:p>
@@ -1201,7 +1201,7 @@
           <a:p>
             <a:fld id="{3D209C7E-7654-CB4E-B98C-B1DF063B3F8E}" type="datetimeFigureOut">
               <a:rPr lang="pt-BR" smtClean="0"/>
-              <a:t>20/11/2024</a:t>
+              <a:t>26/05/2025</a:t>
             </a:fld>
             <a:endParaRPr lang="pt-BR"/>
           </a:p>
@@ -1401,7 +1401,7 @@
           <a:p>
             <a:fld id="{3D209C7E-7654-CB4E-B98C-B1DF063B3F8E}" type="datetimeFigureOut">
               <a:rPr lang="pt-BR" smtClean="0"/>
-              <a:t>20/11/2024</a:t>
+              <a:t>26/05/2025</a:t>
             </a:fld>
             <a:endParaRPr lang="pt-BR"/>
           </a:p>
@@ -1677,7 +1677,7 @@
           <a:p>
             <a:fld id="{3D209C7E-7654-CB4E-B98C-B1DF063B3F8E}" type="datetimeFigureOut">
               <a:rPr lang="pt-BR" smtClean="0"/>
-              <a:t>20/11/2024</a:t>
+              <a:t>26/05/2025</a:t>
             </a:fld>
             <a:endParaRPr lang="pt-BR"/>
           </a:p>
@@ -1945,7 +1945,7 @@
           <a:p>
             <a:fld id="{3D209C7E-7654-CB4E-B98C-B1DF063B3F8E}" type="datetimeFigureOut">
               <a:rPr lang="pt-BR" smtClean="0"/>
-              <a:t>20/11/2024</a:t>
+              <a:t>26/05/2025</a:t>
             </a:fld>
             <a:endParaRPr lang="pt-BR"/>
           </a:p>
@@ -2360,7 +2360,7 @@
           <a:p>
             <a:fld id="{3D209C7E-7654-CB4E-B98C-B1DF063B3F8E}" type="datetimeFigureOut">
               <a:rPr lang="pt-BR" smtClean="0"/>
-              <a:t>20/11/2024</a:t>
+              <a:t>26/05/2025</a:t>
             </a:fld>
             <a:endParaRPr lang="pt-BR"/>
           </a:p>
@@ -2502,7 +2502,7 @@
           <a:p>
             <a:fld id="{3D209C7E-7654-CB4E-B98C-B1DF063B3F8E}" type="datetimeFigureOut">
               <a:rPr lang="pt-BR" smtClean="0"/>
-              <a:t>20/11/2024</a:t>
+              <a:t>26/05/2025</a:t>
             </a:fld>
             <a:endParaRPr lang="pt-BR"/>
           </a:p>
@@ -2615,7 +2615,7 @@
           <a:p>
             <a:fld id="{3D209C7E-7654-CB4E-B98C-B1DF063B3F8E}" type="datetimeFigureOut">
               <a:rPr lang="pt-BR" smtClean="0"/>
-              <a:t>20/11/2024</a:t>
+              <a:t>26/05/2025</a:t>
             </a:fld>
             <a:endParaRPr lang="pt-BR"/>
           </a:p>
@@ -2928,7 +2928,7 @@
           <a:p>
             <a:fld id="{3D209C7E-7654-CB4E-B98C-B1DF063B3F8E}" type="datetimeFigureOut">
               <a:rPr lang="pt-BR" smtClean="0"/>
-              <a:t>20/11/2024</a:t>
+              <a:t>26/05/2025</a:t>
             </a:fld>
             <a:endParaRPr lang="pt-BR"/>
           </a:p>
@@ -3217,7 +3217,7 @@
           <a:p>
             <a:fld id="{3D209C7E-7654-CB4E-B98C-B1DF063B3F8E}" type="datetimeFigureOut">
               <a:rPr lang="pt-BR" smtClean="0"/>
-              <a:t>20/11/2024</a:t>
+              <a:t>26/05/2025</a:t>
             </a:fld>
             <a:endParaRPr lang="pt-BR"/>
           </a:p>
@@ -3460,7 +3460,7 @@
           <a:p>
             <a:fld id="{3D209C7E-7654-CB4E-B98C-B1DF063B3F8E}" type="datetimeFigureOut">
               <a:rPr lang="pt-BR" smtClean="0"/>
-              <a:t>20/11/2024</a:t>
+              <a:t>26/05/2025</a:t>
             </a:fld>
             <a:endParaRPr lang="pt-BR"/>
           </a:p>
@@ -5417,36 +5417,6 @@
           <a:chExt cx="0" cy="0"/>
         </a:xfrm>
       </p:grpSpPr>
-      <p:pic>
-        <p:nvPicPr>
-          <p:cNvPr id="5" name="Picture 4">
-            <a:extLst>
-              <a:ext uri="{FF2B5EF4-FFF2-40B4-BE49-F238E27FC236}">
-                <a16:creationId xmlns:a16="http://schemas.microsoft.com/office/drawing/2014/main" id="{DD4952C8-0CB5-3F69-40C8-028483F51C0C}"/>
-              </a:ext>
-            </a:extLst>
-          </p:cNvPr>
-          <p:cNvPicPr>
-            <a:picLocks noChangeAspect="1"/>
-          </p:cNvPicPr>
-          <p:nvPr/>
-        </p:nvPicPr>
-        <p:blipFill>
-          <a:blip r:embed="rId2"/>
-          <a:stretch>
-            <a:fillRect/>
-          </a:stretch>
-        </p:blipFill>
-        <p:spPr>
-          <a:xfrm>
-            <a:off x="4802304" y="574133"/>
-            <a:ext cx="5397500" cy="5397500"/>
-          </a:xfrm>
-          <a:prstGeom prst="rect">
-            <a:avLst/>
-          </a:prstGeom>
-        </p:spPr>
-      </p:pic>
       <p:grpSp>
         <p:nvGrpSpPr>
           <p:cNvPr id="2" name="Group 1">
@@ -5482,7 +5452,7 @@
             <p:nvPr/>
           </p:nvPicPr>
           <p:blipFill>
-            <a:blip r:embed="rId3"/>
+            <a:blip r:embed="rId2"/>
             <a:stretch>
               <a:fillRect/>
             </a:stretch>
@@ -5889,7 +5859,7 @@
           <p:nvPr/>
         </p:nvPicPr>
         <p:blipFill>
-          <a:blip r:embed="rId4"/>
+          <a:blip r:embed="rId3"/>
           <a:srcRect r="6901"/>
           <a:stretch/>
         </p:blipFill>
@@ -5941,6 +5911,36 @@
           </a:p>
         </p:txBody>
       </p:sp>
+      <p:pic>
+        <p:nvPicPr>
+          <p:cNvPr id="15" name="Picture 14">
+            <a:extLst>
+              <a:ext uri="{FF2B5EF4-FFF2-40B4-BE49-F238E27FC236}">
+                <a16:creationId xmlns:a16="http://schemas.microsoft.com/office/drawing/2014/main" id="{AEEC769E-9DEA-8E6A-C17C-524FF8F6BAA7}"/>
+              </a:ext>
+            </a:extLst>
+          </p:cNvPr>
+          <p:cNvPicPr>
+            <a:picLocks noChangeAspect="1"/>
+          </p:cNvPicPr>
+          <p:nvPr/>
+        </p:nvPicPr>
+        <p:blipFill>
+          <a:blip r:embed="rId4"/>
+          <a:stretch>
+            <a:fillRect/>
+          </a:stretch>
+        </p:blipFill>
+        <p:spPr>
+          <a:xfrm>
+            <a:off x="5230585" y="925362"/>
+            <a:ext cx="5397500" cy="5397500"/>
+          </a:xfrm>
+          <a:prstGeom prst="rect">
+            <a:avLst/>
+          </a:prstGeom>
+        </p:spPr>
+      </p:pic>
     </p:spTree>
     <p:extLst>
       <p:ext uri="{BB962C8B-B14F-4D97-AF65-F5344CB8AC3E}">

</xml_diff>